<commit_message>
fix: update PowerPoint templates for improved formatting
</commit_message>
<xml_diff>
--- a/public/templates/verso-4a-2coluna.pptx
+++ b/public/templates/verso-4a-2coluna.pptx
@@ -276,7 +276,7 @@
           <a:p>
             <a:fld id="{62DE8017-325E-4800-BDDD-E3855642CAE0}" type="datetimeFigureOut">
               <a:rPr lang="pt-BR" smtClean="0"/>
-              <a:t>02/04/2025</a:t>
+              <a:t>06/04/2025</a:t>
             </a:fld>
             <a:endParaRPr lang="pt-BR"/>
           </a:p>
@@ -486,7 +486,7 @@
           <a:p>
             <a:fld id="{62DE8017-325E-4800-BDDD-E3855642CAE0}" type="datetimeFigureOut">
               <a:rPr lang="pt-BR" smtClean="0"/>
-              <a:t>02/04/2025</a:t>
+              <a:t>06/04/2025</a:t>
             </a:fld>
             <a:endParaRPr lang="pt-BR"/>
           </a:p>
@@ -696,7 +696,7 @@
           <a:p>
             <a:fld id="{62DE8017-325E-4800-BDDD-E3855642CAE0}" type="datetimeFigureOut">
               <a:rPr lang="pt-BR" smtClean="0"/>
-              <a:t>02/04/2025</a:t>
+              <a:t>06/04/2025</a:t>
             </a:fld>
             <a:endParaRPr lang="pt-BR"/>
           </a:p>
@@ -906,7 +906,7 @@
           <a:p>
             <a:fld id="{62DE8017-325E-4800-BDDD-E3855642CAE0}" type="datetimeFigureOut">
               <a:rPr lang="pt-BR" smtClean="0"/>
-              <a:t>02/04/2025</a:t>
+              <a:t>06/04/2025</a:t>
             </a:fld>
             <a:endParaRPr lang="pt-BR"/>
           </a:p>
@@ -1180,7 +1180,7 @@
           <a:p>
             <a:fld id="{62DE8017-325E-4800-BDDD-E3855642CAE0}" type="datetimeFigureOut">
               <a:rPr lang="pt-BR" smtClean="0"/>
-              <a:t>02/04/2025</a:t>
+              <a:t>06/04/2025</a:t>
             </a:fld>
             <a:endParaRPr lang="pt-BR"/>
           </a:p>
@@ -1450,7 +1450,7 @@
           <a:p>
             <a:fld id="{62DE8017-325E-4800-BDDD-E3855642CAE0}" type="datetimeFigureOut">
               <a:rPr lang="pt-BR" smtClean="0"/>
-              <a:t>02/04/2025</a:t>
+              <a:t>06/04/2025</a:t>
             </a:fld>
             <a:endParaRPr lang="pt-BR"/>
           </a:p>
@@ -1856,7 +1856,7 @@
           <a:p>
             <a:fld id="{62DE8017-325E-4800-BDDD-E3855642CAE0}" type="datetimeFigureOut">
               <a:rPr lang="pt-BR" smtClean="0"/>
-              <a:t>02/04/2025</a:t>
+              <a:t>06/04/2025</a:t>
             </a:fld>
             <a:endParaRPr lang="pt-BR"/>
           </a:p>
@@ -2006,7 +2006,7 @@
           <a:p>
             <a:fld id="{62DE8017-325E-4800-BDDD-E3855642CAE0}" type="datetimeFigureOut">
               <a:rPr lang="pt-BR" smtClean="0"/>
-              <a:t>02/04/2025</a:t>
+              <a:t>06/04/2025</a:t>
             </a:fld>
             <a:endParaRPr lang="pt-BR"/>
           </a:p>
@@ -2125,7 +2125,7 @@
           <a:p>
             <a:fld id="{62DE8017-325E-4800-BDDD-E3855642CAE0}" type="datetimeFigureOut">
               <a:rPr lang="pt-BR" smtClean="0"/>
-              <a:t>02/04/2025</a:t>
+              <a:t>06/04/2025</a:t>
             </a:fld>
             <a:endParaRPr lang="pt-BR"/>
           </a:p>
@@ -2435,7 +2435,7 @@
           <a:p>
             <a:fld id="{62DE8017-325E-4800-BDDD-E3855642CAE0}" type="datetimeFigureOut">
               <a:rPr lang="pt-BR" smtClean="0"/>
-              <a:t>02/04/2025</a:t>
+              <a:t>06/04/2025</a:t>
             </a:fld>
             <a:endParaRPr lang="pt-BR"/>
           </a:p>
@@ -2725,7 +2725,7 @@
           <a:p>
             <a:fld id="{62DE8017-325E-4800-BDDD-E3855642CAE0}" type="datetimeFigureOut">
               <a:rPr lang="pt-BR" smtClean="0"/>
-              <a:t>02/04/2025</a:t>
+              <a:t>06/04/2025</a:t>
             </a:fld>
             <a:endParaRPr lang="pt-BR"/>
           </a:p>
@@ -3685,7 +3685,7 @@
         </p:nvSpPr>
         <p:spPr>
           <a:xfrm>
-            <a:off x="4935597" y="3931955"/>
+            <a:off x="4952849" y="3931955"/>
             <a:ext cx="2232000" cy="984885"/>
           </a:xfrm>
           <a:prstGeom prst="rect">
@@ -3867,7 +3867,7 @@
         </p:nvSpPr>
         <p:spPr>
           <a:xfrm>
-            <a:off x="7198035" y="3931955"/>
+            <a:off x="7215287" y="3931955"/>
             <a:ext cx="2232000" cy="984885"/>
           </a:xfrm>
           <a:prstGeom prst="rect">
@@ -4174,7 +4174,7 @@
         </p:nvSpPr>
         <p:spPr>
           <a:xfrm>
-            <a:off x="2668741" y="3931955"/>
+            <a:off x="2685993" y="3931955"/>
             <a:ext cx="2240692" cy="984885"/>
           </a:xfrm>
           <a:prstGeom prst="rect">

</xml_diff>